<commit_message>
Added product outline slide before the begin product demo slide
</commit_message>
<xml_diff>
--- a/resources/glucocheck-Demo2.pptx
+++ b/resources/glucocheck-Demo2.pptx
@@ -5,32 +5,33 @@
     <p:sldMasterId id="2147483661" r:id="rId1"/>
   </p:sldMasterIdLst>
   <p:notesMasterIdLst>
-    <p:notesMasterId r:id="rId8"/>
+    <p:notesMasterId r:id="rId9"/>
   </p:notesMasterIdLst>
   <p:sldIdLst>
     <p:sldId id="256" r:id="rId2"/>
     <p:sldId id="295" r:id="rId3"/>
     <p:sldId id="299" r:id="rId4"/>
     <p:sldId id="296" r:id="rId5"/>
-    <p:sldId id="300" r:id="rId6"/>
-    <p:sldId id="301" r:id="rId7"/>
+    <p:sldId id="302" r:id="rId6"/>
+    <p:sldId id="300" r:id="rId7"/>
+    <p:sldId id="301" r:id="rId8"/>
   </p:sldIdLst>
   <p:sldSz cx="9144000" cy="5143500" type="screen16x9"/>
   <p:notesSz cx="6858000" cy="9144000"/>
   <p:embeddedFontLst>
     <p:embeddedFont>
       <p:font typeface="Calibri" panose="020F0502020204030204" pitchFamily="34" charset="0"/>
-      <p:regular r:id="rId9"/>
-      <p:bold r:id="rId10"/>
-      <p:italic r:id="rId11"/>
-      <p:boldItalic r:id="rId12"/>
+      <p:regular r:id="rId10"/>
+      <p:bold r:id="rId11"/>
+      <p:italic r:id="rId12"/>
+      <p:boldItalic r:id="rId13"/>
     </p:embeddedFont>
     <p:embeddedFont>
       <p:font typeface="Playfair Display Regular" panose="020B0604020202020204" charset="0"/>
-      <p:regular r:id="rId13"/>
-      <p:bold r:id="rId14"/>
-      <p:italic r:id="rId15"/>
-      <p:boldItalic r:id="rId16"/>
+      <p:regular r:id="rId14"/>
+      <p:bold r:id="rId15"/>
+      <p:italic r:id="rId16"/>
+      <p:boldItalic r:id="rId17"/>
     </p:embeddedFont>
   </p:embeddedFontLst>
   <p:defaultTextStyle>
@@ -271,6 +272,7 @@
             <p14:sldId id="295"/>
             <p14:sldId id="299"/>
             <p14:sldId id="296"/>
+            <p14:sldId id="302"/>
             <p14:sldId id="300"/>
             <p14:sldId id="301"/>
           </p14:sldIdLst>
@@ -1255,6 +1257,115 @@
     </p:spTree>
     <p:extLst>
       <p:ext uri="{BB962C8B-B14F-4D97-AF65-F5344CB8AC3E}">
+        <p14:creationId xmlns:p14="http://schemas.microsoft.com/office/powerpoint/2010/main" val="3479595315"/>
+      </p:ext>
+    </p:extLst>
+  </p:cSld>
+  <p:clrMapOvr>
+    <a:masterClrMapping/>
+  </p:clrMapOvr>
+</p:notes>
+</file>
+
+<file path=ppt/notesSlides/notesSlide6.xml><?xml version="1.0" encoding="utf-8"?>
+<p:notes xmlns:a="http://schemas.openxmlformats.org/drawingml/2006/main" xmlns:r="http://schemas.openxmlformats.org/officeDocument/2006/relationships" xmlns:p="http://schemas.openxmlformats.org/presentationml/2006/main" showMasterSp="0" showMasterPhAnim="0">
+  <p:cSld>
+    <p:spTree>
+      <p:nvGrpSpPr>
+        <p:cNvPr id="1" name="Shape 75"/>
+        <p:cNvGrpSpPr/>
+        <p:nvPr/>
+      </p:nvGrpSpPr>
+      <p:grpSpPr>
+        <a:xfrm>
+          <a:off x="0" y="0"/>
+          <a:ext cx="0" cy="0"/>
+          <a:chOff x="0" y="0"/>
+          <a:chExt cx="0" cy="0"/>
+        </a:xfrm>
+      </p:grpSpPr>
+      <p:sp>
+        <p:nvSpPr>
+          <p:cNvPr id="76" name="Google Shape;76;g35f391192_00:notes"/>
+          <p:cNvSpPr>
+            <a:spLocks noGrp="1" noRot="1" noChangeAspect="1"/>
+          </p:cNvSpPr>
+          <p:nvPr>
+            <p:ph type="sldImg" idx="2"/>
+          </p:nvPr>
+        </p:nvSpPr>
+        <p:spPr>
+          <a:xfrm>
+            <a:off x="381000" y="685800"/>
+            <a:ext cx="6096000" cy="3429000"/>
+          </a:xfrm>
+          <a:custGeom>
+            <a:avLst/>
+            <a:gdLst/>
+            <a:ahLst/>
+            <a:cxnLst/>
+            <a:rect l="l" t="t" r="r" b="b"/>
+            <a:pathLst>
+              <a:path w="120000" h="120000" extrusionOk="0">
+                <a:moveTo>
+                  <a:pt x="0" y="0"/>
+                </a:moveTo>
+                <a:lnTo>
+                  <a:pt x="120000" y="0"/>
+                </a:lnTo>
+                <a:lnTo>
+                  <a:pt x="120000" y="120000"/>
+                </a:lnTo>
+                <a:lnTo>
+                  <a:pt x="0" y="120000"/>
+                </a:lnTo>
+                <a:close/>
+              </a:path>
+            </a:pathLst>
+          </a:custGeom>
+        </p:spPr>
+      </p:sp>
+      <p:sp>
+        <p:nvSpPr>
+          <p:cNvPr id="77" name="Google Shape;77;g35f391192_00:notes"/>
+          <p:cNvSpPr txBox="1">
+            <a:spLocks noGrp="1"/>
+          </p:cNvSpPr>
+          <p:nvPr>
+            <p:ph type="body" idx="1"/>
+          </p:nvPr>
+        </p:nvSpPr>
+        <p:spPr>
+          <a:xfrm>
+            <a:off x="685800" y="4343400"/>
+            <a:ext cx="5486400" cy="4114800"/>
+          </a:xfrm>
+          <a:prstGeom prst="rect">
+            <a:avLst/>
+          </a:prstGeom>
+        </p:spPr>
+        <p:txBody>
+          <a:bodyPr spcFirstLastPara="1" wrap="square" lIns="91425" tIns="91425" rIns="91425" bIns="91425" anchor="t" anchorCtr="0">
+            <a:noAutofit/>
+          </a:bodyPr>
+          <a:lstStyle/>
+          <a:p>
+            <a:pPr marL="0" lvl="0" indent="0" algn="l" rtl="0">
+              <a:spcBef>
+                <a:spcPts val="0"/>
+              </a:spcBef>
+              <a:spcAft>
+                <a:spcPts val="0"/>
+              </a:spcAft>
+              <a:buNone/>
+            </a:pPr>
+            <a:endParaRPr/>
+          </a:p>
+        </p:txBody>
+      </p:sp>
+    </p:spTree>
+    <p:extLst>
+      <p:ext uri="{BB962C8B-B14F-4D97-AF65-F5344CB8AC3E}">
         <p14:creationId xmlns:p14="http://schemas.microsoft.com/office/powerpoint/2010/main" val="1458971338"/>
       </p:ext>
     </p:extLst>
@@ -1265,7 +1376,7 @@
 </p:notes>
 </file>
 
-<file path=ppt/notesSlides/notesSlide6.xml><?xml version="1.0" encoding="utf-8"?>
+<file path=ppt/notesSlides/notesSlide7.xml><?xml version="1.0" encoding="utf-8"?>
 <p:notes xmlns:a="http://schemas.openxmlformats.org/drawingml/2006/main" xmlns:r="http://schemas.openxmlformats.org/officeDocument/2006/relationships" xmlns:p="http://schemas.openxmlformats.org/presentationml/2006/main" showMasterSp="0" showMasterPhAnim="0">
   <p:cSld>
     <p:spTree>
@@ -13255,6 +13366,1826 @@
           <a:chExt cx="0" cy="0"/>
         </a:xfrm>
       </p:grpSpPr>
+      <p:pic>
+        <p:nvPicPr>
+          <p:cNvPr id="7" name="Picture 6">
+            <a:hlinkClick r:id="rId3" action="ppaction://hlinksldjump"/>
+            <a:extLst>
+              <a:ext uri="{FF2B5EF4-FFF2-40B4-BE49-F238E27FC236}">
+                <a16:creationId xmlns:a16="http://schemas.microsoft.com/office/drawing/2014/main" id="{A010EE42-389D-7148-95D2-21CC1C6C70E5}"/>
+              </a:ext>
+            </a:extLst>
+          </p:cNvPr>
+          <p:cNvPicPr>
+            <a:picLocks noChangeAspect="1"/>
+          </p:cNvPicPr>
+          <p:nvPr/>
+        </p:nvPicPr>
+        <p:blipFill>
+          <a:blip r:embed="rId4"/>
+          <a:stretch>
+            <a:fillRect/>
+          </a:stretch>
+        </p:blipFill>
+        <p:spPr>
+          <a:xfrm>
+            <a:off x="413045" y="538398"/>
+            <a:ext cx="1681569" cy="383594"/>
+          </a:xfrm>
+          <a:prstGeom prst="rect">
+            <a:avLst/>
+          </a:prstGeom>
+        </p:spPr>
+      </p:pic>
+      <p:pic>
+        <p:nvPicPr>
+          <p:cNvPr id="41" name="Picture 40">
+            <a:extLst>
+              <a:ext uri="{FF2B5EF4-FFF2-40B4-BE49-F238E27FC236}">
+                <a16:creationId xmlns:a16="http://schemas.microsoft.com/office/drawing/2014/main" id="{BE2C9300-77DE-A248-97B3-6655547CA6D2}"/>
+              </a:ext>
+            </a:extLst>
+          </p:cNvPr>
+          <p:cNvPicPr>
+            <a:picLocks noChangeAspect="1"/>
+          </p:cNvPicPr>
+          <p:nvPr/>
+        </p:nvPicPr>
+        <p:blipFill>
+          <a:blip r:embed="rId5"/>
+          <a:stretch>
+            <a:fillRect/>
+          </a:stretch>
+        </p:blipFill>
+        <p:spPr>
+          <a:xfrm>
+            <a:off x="0" y="0"/>
+            <a:ext cx="9144000" cy="478402"/>
+          </a:xfrm>
+          <a:prstGeom prst="rect">
+            <a:avLst/>
+          </a:prstGeom>
+        </p:spPr>
+      </p:pic>
+      <p:sp>
+        <p:nvSpPr>
+          <p:cNvPr id="43" name="TextBox 42">
+            <a:extLst>
+              <a:ext uri="{FF2B5EF4-FFF2-40B4-BE49-F238E27FC236}">
+                <a16:creationId xmlns:a16="http://schemas.microsoft.com/office/drawing/2014/main" id="{102406AA-4F54-434E-80BC-9B6BCB539E98}"/>
+              </a:ext>
+            </a:extLst>
+          </p:cNvPr>
+          <p:cNvSpPr txBox="1"/>
+          <p:nvPr/>
+        </p:nvSpPr>
+        <p:spPr>
+          <a:xfrm>
+            <a:off x="1253911" y="195451"/>
+            <a:ext cx="1814920" cy="253916"/>
+          </a:xfrm>
+          <a:prstGeom prst="rect">
+            <a:avLst/>
+          </a:prstGeom>
+          <a:noFill/>
+        </p:spPr>
+        <p:txBody>
+          <a:bodyPr wrap="none" rtlCol="0">
+            <a:spAutoFit/>
+          </a:bodyPr>
+          <a:lstStyle/>
+          <a:p>
+            <a:r>
+              <a:rPr lang="en-US" sz="1050" dirty="0">
+                <a:latin typeface="Calibri" panose="020F0502020204030204" pitchFamily="34" charset="0"/>
+                <a:cs typeface="Calibri" panose="020F0502020204030204" pitchFamily="34" charset="0"/>
+              </a:rPr>
+              <a:t>http://127.0.0.1:8000/outline</a:t>
+            </a:r>
+          </a:p>
+        </p:txBody>
+      </p:sp>
+      <p:sp>
+        <p:nvSpPr>
+          <p:cNvPr id="32" name="TextBox 31">
+            <a:extLst>
+              <a:ext uri="{FF2B5EF4-FFF2-40B4-BE49-F238E27FC236}">
+                <a16:creationId xmlns:a16="http://schemas.microsoft.com/office/drawing/2014/main" id="{6B12AA7F-15DF-BE42-A704-9C6A62991E01}"/>
+              </a:ext>
+            </a:extLst>
+          </p:cNvPr>
+          <p:cNvSpPr txBox="1"/>
+          <p:nvPr/>
+        </p:nvSpPr>
+        <p:spPr>
+          <a:xfrm>
+            <a:off x="3192262" y="1374040"/>
+            <a:ext cx="1837362" cy="400110"/>
+          </a:xfrm>
+          <a:prstGeom prst="rect">
+            <a:avLst/>
+          </a:prstGeom>
+          <a:noFill/>
+        </p:spPr>
+        <p:txBody>
+          <a:bodyPr wrap="none" rtlCol="0">
+            <a:spAutoFit/>
+          </a:bodyPr>
+          <a:lstStyle/>
+          <a:p>
+            <a:r>
+              <a:rPr lang="en-US" sz="2000" dirty="0">
+                <a:solidFill>
+                  <a:srgbClr val="272364"/>
+                </a:solidFill>
+                <a:latin typeface="Calibri" panose="020F0502020204030204" pitchFamily="34" charset="0"/>
+                <a:cs typeface="Calibri" panose="020F0502020204030204" pitchFamily="34" charset="0"/>
+              </a:rPr>
+              <a:t>Product</a:t>
+            </a:r>
+            <a:r>
+              <a:rPr lang="en-US" sz="2000" dirty="0">
+                <a:latin typeface="Calibri" panose="020F0502020204030204" pitchFamily="34" charset="0"/>
+                <a:cs typeface="Calibri" panose="020F0502020204030204" pitchFamily="34" charset="0"/>
+              </a:rPr>
+              <a:t> </a:t>
+            </a:r>
+            <a:r>
+              <a:rPr lang="en-US" sz="2000" dirty="0">
+                <a:solidFill>
+                  <a:srgbClr val="F3768E"/>
+                </a:solidFill>
+                <a:latin typeface="Calibri" panose="020F0502020204030204" pitchFamily="34" charset="0"/>
+                <a:cs typeface="Calibri" panose="020F0502020204030204" pitchFamily="34" charset="0"/>
+              </a:rPr>
+              <a:t>Outline</a:t>
+            </a:r>
+          </a:p>
+        </p:txBody>
+      </p:sp>
+      <p:sp>
+        <p:nvSpPr>
+          <p:cNvPr id="42" name="TextBox 41">
+            <a:extLst>
+              <a:ext uri="{FF2B5EF4-FFF2-40B4-BE49-F238E27FC236}">
+                <a16:creationId xmlns:a16="http://schemas.microsoft.com/office/drawing/2014/main" id="{87CE02F0-B5A7-6D40-BC06-A4A5BA74AB34}"/>
+              </a:ext>
+            </a:extLst>
+          </p:cNvPr>
+          <p:cNvSpPr txBox="1"/>
+          <p:nvPr/>
+        </p:nvSpPr>
+        <p:spPr>
+          <a:xfrm>
+            <a:off x="496845" y="2023900"/>
+            <a:ext cx="4583746" cy="2321085"/>
+          </a:xfrm>
+          <a:prstGeom prst="rect">
+            <a:avLst/>
+          </a:prstGeom>
+          <a:noFill/>
+        </p:spPr>
+        <p:txBody>
+          <a:bodyPr wrap="square" rtlCol="0">
+            <a:spAutoFit/>
+          </a:bodyPr>
+          <a:lstStyle/>
+          <a:p>
+            <a:pPr>
+              <a:lnSpc>
+                <a:spcPct val="150000"/>
+              </a:lnSpc>
+            </a:pPr>
+            <a:r>
+              <a:rPr lang="en-US" dirty="0">
+                <a:solidFill>
+                  <a:srgbClr val="8CC63F"/>
+                </a:solidFill>
+                <a:latin typeface="Calibri" panose="020F0502020204030204" pitchFamily="34" charset="0"/>
+                <a:cs typeface="Calibri" panose="020F0502020204030204" pitchFamily="34" charset="0"/>
+              </a:rPr>
+              <a:t>Sprint 1 </a:t>
+            </a:r>
+            <a:r>
+              <a:rPr lang="en-US" dirty="0">
+                <a:solidFill>
+                  <a:srgbClr val="272364"/>
+                </a:solidFill>
+                <a:latin typeface="Calibri" panose="020F0502020204030204" pitchFamily="34" charset="0"/>
+                <a:cs typeface="Calibri" panose="020F0502020204030204" pitchFamily="34" charset="0"/>
+              </a:rPr>
+              <a:t>- Set up a compliant, secure website that allows users to signup and login to the app</a:t>
+            </a:r>
+          </a:p>
+          <a:p>
+            <a:pPr>
+              <a:lnSpc>
+                <a:spcPct val="150000"/>
+              </a:lnSpc>
+            </a:pPr>
+            <a:r>
+              <a:rPr lang="en-US" dirty="0">
+                <a:solidFill>
+                  <a:srgbClr val="8CC63F"/>
+                </a:solidFill>
+                <a:latin typeface="Calibri" panose="020F0502020204030204" pitchFamily="34" charset="0"/>
+                <a:cs typeface="Calibri" panose="020F0502020204030204" pitchFamily="34" charset="0"/>
+              </a:rPr>
+              <a:t>Sprint 2 </a:t>
+            </a:r>
+            <a:r>
+              <a:rPr lang="en-US" dirty="0">
+                <a:solidFill>
+                  <a:srgbClr val="272364"/>
+                </a:solidFill>
+                <a:latin typeface="Calibri" panose="020F0502020204030204" pitchFamily="34" charset="0"/>
+                <a:cs typeface="Calibri" panose="020F0502020204030204" pitchFamily="34" charset="0"/>
+              </a:rPr>
+              <a:t>- Add data entry and visualization to the app and make sure the experience is accessible, clear, and robust</a:t>
+            </a:r>
+          </a:p>
+          <a:p>
+            <a:pPr>
+              <a:lnSpc>
+                <a:spcPct val="150000"/>
+              </a:lnSpc>
+            </a:pPr>
+            <a:r>
+              <a:rPr lang="en-US" dirty="0">
+                <a:solidFill>
+                  <a:srgbClr val="8CC63F"/>
+                </a:solidFill>
+                <a:latin typeface="Calibri" panose="020F0502020204030204" pitchFamily="34" charset="0"/>
+                <a:cs typeface="Calibri" panose="020F0502020204030204" pitchFamily="34" charset="0"/>
+              </a:rPr>
+              <a:t>Sprint 3 </a:t>
+            </a:r>
+            <a:r>
+              <a:rPr lang="en-US" dirty="0">
+                <a:solidFill>
+                  <a:srgbClr val="272364"/>
+                </a:solidFill>
+                <a:latin typeface="Calibri" panose="020F0502020204030204" pitchFamily="34" charset="0"/>
+                <a:cs typeface="Calibri" panose="020F0502020204030204" pitchFamily="34" charset="0"/>
+              </a:rPr>
+              <a:t>- Provide better data input, dietary advice, and more general polish to the user to aid in differentiation and customer retention</a:t>
+            </a:r>
+            <a:endParaRPr lang="en-US" dirty="0">
+              <a:solidFill>
+                <a:srgbClr val="F3768E"/>
+              </a:solidFill>
+              <a:latin typeface="Calibri" panose="020F0502020204030204" pitchFamily="34" charset="0"/>
+              <a:cs typeface="Calibri" panose="020F0502020204030204" pitchFamily="34" charset="0"/>
+            </a:endParaRPr>
+          </a:p>
+        </p:txBody>
+      </p:sp>
+      <p:pic>
+        <p:nvPicPr>
+          <p:cNvPr id="6" name="Graphic 5">
+            <a:extLst>
+              <a:ext uri="{FF2B5EF4-FFF2-40B4-BE49-F238E27FC236}">
+                <a16:creationId xmlns:a16="http://schemas.microsoft.com/office/drawing/2014/main" id="{11450E05-AE9B-4A06-BF5F-D5CA4E0AB273}"/>
+              </a:ext>
+            </a:extLst>
+          </p:cNvPr>
+          <p:cNvPicPr>
+            <a:picLocks noChangeAspect="1"/>
+          </p:cNvPicPr>
+          <p:nvPr/>
+        </p:nvPicPr>
+        <p:blipFill>
+          <a:blip r:embed="rId6">
+            <a:extLst>
+              <a:ext uri="{96DAC541-7B7A-43D3-8B79-37D633B846F1}">
+                <asvg:svgBlip xmlns:asvg="http://schemas.microsoft.com/office/drawing/2016/SVG/main" r:embed="rId7"/>
+              </a:ext>
+            </a:extLst>
+          </a:blip>
+          <a:stretch>
+            <a:fillRect/>
+          </a:stretch>
+        </p:blipFill>
+        <p:spPr>
+          <a:xfrm>
+            <a:off x="5514045" y="1624398"/>
+            <a:ext cx="2899145" cy="2899145"/>
+          </a:xfrm>
+          <a:prstGeom prst="rect">
+            <a:avLst/>
+          </a:prstGeom>
+        </p:spPr>
+      </p:pic>
+      <p:sp>
+        <p:nvSpPr>
+          <p:cNvPr id="14" name="Google Shape;79;p15">
+            <a:extLst>
+              <a:ext uri="{FF2B5EF4-FFF2-40B4-BE49-F238E27FC236}">
+                <a16:creationId xmlns:a16="http://schemas.microsoft.com/office/drawing/2014/main" id="{4665C0D9-32EB-466E-B3D2-2C03E89140F5}"/>
+              </a:ext>
+            </a:extLst>
+          </p:cNvPr>
+          <p:cNvSpPr txBox="1">
+            <a:spLocks/>
+          </p:cNvSpPr>
+          <p:nvPr/>
+        </p:nvSpPr>
+        <p:spPr>
+          <a:xfrm>
+            <a:off x="4665921" y="609404"/>
+            <a:ext cx="414670" cy="312588"/>
+          </a:xfrm>
+          <a:prstGeom prst="rect">
+            <a:avLst/>
+          </a:prstGeom>
+          <a:noFill/>
+          <a:ln>
+            <a:noFill/>
+          </a:ln>
+        </p:spPr>
+        <p:txBody>
+          <a:bodyPr spcFirstLastPara="1" wrap="square" lIns="0" tIns="0" rIns="0" bIns="0" anchor="ctr" anchorCtr="0">
+            <a:noAutofit/>
+          </a:bodyPr>
+          <a:lstStyle>
+            <a:defPPr marR="0" lvl="0" algn="l" rtl="0">
+              <a:lnSpc>
+                <a:spcPct val="100000"/>
+              </a:lnSpc>
+              <a:spcBef>
+                <a:spcPts val="0"/>
+              </a:spcBef>
+              <a:spcAft>
+                <a:spcPts val="0"/>
+              </a:spcAft>
+            </a:defPPr>
+            <a:lvl1pPr marR="0" lvl="0" algn="l" rtl="0">
+              <a:lnSpc>
+                <a:spcPct val="90000"/>
+              </a:lnSpc>
+              <a:spcBef>
+                <a:spcPts val="0"/>
+              </a:spcBef>
+              <a:spcAft>
+                <a:spcPts val="0"/>
+              </a:spcAft>
+              <a:buClr>
+                <a:schemeClr val="dk1"/>
+              </a:buClr>
+              <a:buSzPts val="3200"/>
+              <a:buFont typeface="Playfair Display Regular"/>
+              <a:buNone/>
+              <a:defRPr sz="3200" b="0" i="0" u="none" strike="noStrike" cap="none">
+                <a:solidFill>
+                  <a:schemeClr val="dk1"/>
+                </a:solidFill>
+                <a:latin typeface="Playfair Display Regular"/>
+                <a:ea typeface="Playfair Display Regular"/>
+                <a:cs typeface="Playfair Display Regular"/>
+                <a:sym typeface="Playfair Display Regular"/>
+              </a:defRPr>
+            </a:lvl1pPr>
+            <a:lvl2pPr marR="0" lvl="1" algn="l" rtl="0">
+              <a:lnSpc>
+                <a:spcPct val="90000"/>
+              </a:lnSpc>
+              <a:spcBef>
+                <a:spcPts val="0"/>
+              </a:spcBef>
+              <a:spcAft>
+                <a:spcPts val="0"/>
+              </a:spcAft>
+              <a:buClr>
+                <a:schemeClr val="dk1"/>
+              </a:buClr>
+              <a:buSzPts val="3200"/>
+              <a:buFont typeface="Playfair Display Regular"/>
+              <a:buNone/>
+              <a:defRPr sz="3200" b="0" i="0" u="none" strike="noStrike" cap="none">
+                <a:solidFill>
+                  <a:schemeClr val="dk1"/>
+                </a:solidFill>
+                <a:latin typeface="Playfair Display Regular"/>
+                <a:ea typeface="Playfair Display Regular"/>
+                <a:cs typeface="Playfair Display Regular"/>
+                <a:sym typeface="Playfair Display Regular"/>
+              </a:defRPr>
+            </a:lvl2pPr>
+            <a:lvl3pPr marR="0" lvl="2" algn="l" rtl="0">
+              <a:lnSpc>
+                <a:spcPct val="90000"/>
+              </a:lnSpc>
+              <a:spcBef>
+                <a:spcPts val="0"/>
+              </a:spcBef>
+              <a:spcAft>
+                <a:spcPts val="0"/>
+              </a:spcAft>
+              <a:buClr>
+                <a:schemeClr val="dk1"/>
+              </a:buClr>
+              <a:buSzPts val="3200"/>
+              <a:buFont typeface="Playfair Display Regular"/>
+              <a:buNone/>
+              <a:defRPr sz="3200" b="0" i="0" u="none" strike="noStrike" cap="none">
+                <a:solidFill>
+                  <a:schemeClr val="dk1"/>
+                </a:solidFill>
+                <a:latin typeface="Playfair Display Regular"/>
+                <a:ea typeface="Playfair Display Regular"/>
+                <a:cs typeface="Playfair Display Regular"/>
+                <a:sym typeface="Playfair Display Regular"/>
+              </a:defRPr>
+            </a:lvl3pPr>
+            <a:lvl4pPr marR="0" lvl="3" algn="l" rtl="0">
+              <a:lnSpc>
+                <a:spcPct val="90000"/>
+              </a:lnSpc>
+              <a:spcBef>
+                <a:spcPts val="0"/>
+              </a:spcBef>
+              <a:spcAft>
+                <a:spcPts val="0"/>
+              </a:spcAft>
+              <a:buClr>
+                <a:schemeClr val="dk1"/>
+              </a:buClr>
+              <a:buSzPts val="3200"/>
+              <a:buFont typeface="Playfair Display Regular"/>
+              <a:buNone/>
+              <a:defRPr sz="3200" b="0" i="0" u="none" strike="noStrike" cap="none">
+                <a:solidFill>
+                  <a:schemeClr val="dk1"/>
+                </a:solidFill>
+                <a:latin typeface="Playfair Display Regular"/>
+                <a:ea typeface="Playfair Display Regular"/>
+                <a:cs typeface="Playfair Display Regular"/>
+                <a:sym typeface="Playfair Display Regular"/>
+              </a:defRPr>
+            </a:lvl4pPr>
+            <a:lvl5pPr marR="0" lvl="4" algn="l" rtl="0">
+              <a:lnSpc>
+                <a:spcPct val="90000"/>
+              </a:lnSpc>
+              <a:spcBef>
+                <a:spcPts val="0"/>
+              </a:spcBef>
+              <a:spcAft>
+                <a:spcPts val="0"/>
+              </a:spcAft>
+              <a:buClr>
+                <a:schemeClr val="dk1"/>
+              </a:buClr>
+              <a:buSzPts val="3200"/>
+              <a:buFont typeface="Playfair Display Regular"/>
+              <a:buNone/>
+              <a:defRPr sz="3200" b="0" i="0" u="none" strike="noStrike" cap="none">
+                <a:solidFill>
+                  <a:schemeClr val="dk1"/>
+                </a:solidFill>
+                <a:latin typeface="Playfair Display Regular"/>
+                <a:ea typeface="Playfair Display Regular"/>
+                <a:cs typeface="Playfair Display Regular"/>
+                <a:sym typeface="Playfair Display Regular"/>
+              </a:defRPr>
+            </a:lvl5pPr>
+            <a:lvl6pPr marR="0" lvl="5" algn="l" rtl="0">
+              <a:lnSpc>
+                <a:spcPct val="90000"/>
+              </a:lnSpc>
+              <a:spcBef>
+                <a:spcPts val="0"/>
+              </a:spcBef>
+              <a:spcAft>
+                <a:spcPts val="0"/>
+              </a:spcAft>
+              <a:buClr>
+                <a:schemeClr val="dk1"/>
+              </a:buClr>
+              <a:buSzPts val="3200"/>
+              <a:buFont typeface="Playfair Display Regular"/>
+              <a:buNone/>
+              <a:defRPr sz="3200" b="0" i="0" u="none" strike="noStrike" cap="none">
+                <a:solidFill>
+                  <a:schemeClr val="dk1"/>
+                </a:solidFill>
+                <a:latin typeface="Playfair Display Regular"/>
+                <a:ea typeface="Playfair Display Regular"/>
+                <a:cs typeface="Playfair Display Regular"/>
+                <a:sym typeface="Playfair Display Regular"/>
+              </a:defRPr>
+            </a:lvl6pPr>
+            <a:lvl7pPr marR="0" lvl="6" algn="l" rtl="0">
+              <a:lnSpc>
+                <a:spcPct val="90000"/>
+              </a:lnSpc>
+              <a:spcBef>
+                <a:spcPts val="0"/>
+              </a:spcBef>
+              <a:spcAft>
+                <a:spcPts val="0"/>
+              </a:spcAft>
+              <a:buClr>
+                <a:schemeClr val="dk1"/>
+              </a:buClr>
+              <a:buSzPts val="3200"/>
+              <a:buFont typeface="Playfair Display Regular"/>
+              <a:buNone/>
+              <a:defRPr sz="3200" b="0" i="0" u="none" strike="noStrike" cap="none">
+                <a:solidFill>
+                  <a:schemeClr val="dk1"/>
+                </a:solidFill>
+                <a:latin typeface="Playfair Display Regular"/>
+                <a:ea typeface="Playfair Display Regular"/>
+                <a:cs typeface="Playfair Display Regular"/>
+                <a:sym typeface="Playfair Display Regular"/>
+              </a:defRPr>
+            </a:lvl7pPr>
+            <a:lvl8pPr marR="0" lvl="7" algn="l" rtl="0">
+              <a:lnSpc>
+                <a:spcPct val="90000"/>
+              </a:lnSpc>
+              <a:spcBef>
+                <a:spcPts val="0"/>
+              </a:spcBef>
+              <a:spcAft>
+                <a:spcPts val="0"/>
+              </a:spcAft>
+              <a:buClr>
+                <a:schemeClr val="dk1"/>
+              </a:buClr>
+              <a:buSzPts val="3200"/>
+              <a:buFont typeface="Playfair Display Regular"/>
+              <a:buNone/>
+              <a:defRPr sz="3200" b="0" i="0" u="none" strike="noStrike" cap="none">
+                <a:solidFill>
+                  <a:schemeClr val="dk1"/>
+                </a:solidFill>
+                <a:latin typeface="Playfair Display Regular"/>
+                <a:ea typeface="Playfair Display Regular"/>
+                <a:cs typeface="Playfair Display Regular"/>
+                <a:sym typeface="Playfair Display Regular"/>
+              </a:defRPr>
+            </a:lvl8pPr>
+            <a:lvl9pPr marR="0" lvl="8" algn="l" rtl="0">
+              <a:lnSpc>
+                <a:spcPct val="90000"/>
+              </a:lnSpc>
+              <a:spcBef>
+                <a:spcPts val="0"/>
+              </a:spcBef>
+              <a:spcAft>
+                <a:spcPts val="0"/>
+              </a:spcAft>
+              <a:buClr>
+                <a:schemeClr val="dk1"/>
+              </a:buClr>
+              <a:buSzPts val="3200"/>
+              <a:buFont typeface="Playfair Display Regular"/>
+              <a:buNone/>
+              <a:defRPr sz="3200" b="0" i="0" u="none" strike="noStrike" cap="none">
+                <a:solidFill>
+                  <a:schemeClr val="dk1"/>
+                </a:solidFill>
+                <a:latin typeface="Playfair Display Regular"/>
+                <a:ea typeface="Playfair Display Regular"/>
+                <a:cs typeface="Playfair Display Regular"/>
+                <a:sym typeface="Playfair Display Regular"/>
+              </a:defRPr>
+            </a:lvl9pPr>
+          </a:lstStyle>
+          <a:p>
+            <a:r>
+              <a:rPr lang="en-US" sz="1100">
+                <a:solidFill>
+                  <a:srgbClr val="272364"/>
+                </a:solidFill>
+                <a:latin typeface="Calibri" panose="020F0502020204030204" pitchFamily="34" charset="0"/>
+                <a:cs typeface="Calibri" panose="020F0502020204030204" pitchFamily="34" charset="0"/>
+              </a:rPr>
+              <a:t>Home</a:t>
+            </a:r>
+            <a:endParaRPr lang="en-US" sz="1100" dirty="0">
+              <a:solidFill>
+                <a:srgbClr val="272364"/>
+              </a:solidFill>
+              <a:latin typeface="Calibri" panose="020F0502020204030204" pitchFamily="34" charset="0"/>
+              <a:cs typeface="Calibri" panose="020F0502020204030204" pitchFamily="34" charset="0"/>
+            </a:endParaRPr>
+          </a:p>
+        </p:txBody>
+      </p:sp>
+      <p:sp>
+        <p:nvSpPr>
+          <p:cNvPr id="15" name="Google Shape;79;p15">
+            <a:extLst>
+              <a:ext uri="{FF2B5EF4-FFF2-40B4-BE49-F238E27FC236}">
+                <a16:creationId xmlns:a16="http://schemas.microsoft.com/office/drawing/2014/main" id="{F3BBCD78-60D9-453C-94E3-C80741735C59}"/>
+              </a:ext>
+            </a:extLst>
+          </p:cNvPr>
+          <p:cNvSpPr txBox="1">
+            <a:spLocks/>
+          </p:cNvSpPr>
+          <p:nvPr/>
+        </p:nvSpPr>
+        <p:spPr>
+          <a:xfrm>
+            <a:off x="5352606" y="605510"/>
+            <a:ext cx="892249" cy="312588"/>
+          </a:xfrm>
+          <a:prstGeom prst="rect">
+            <a:avLst/>
+          </a:prstGeom>
+          <a:noFill/>
+          <a:ln>
+            <a:noFill/>
+          </a:ln>
+        </p:spPr>
+        <p:txBody>
+          <a:bodyPr spcFirstLastPara="1" wrap="square" lIns="0" tIns="0" rIns="0" bIns="0" anchor="ctr" anchorCtr="0">
+            <a:noAutofit/>
+          </a:bodyPr>
+          <a:lstStyle>
+            <a:defPPr marR="0" lvl="0" algn="l" rtl="0">
+              <a:lnSpc>
+                <a:spcPct val="100000"/>
+              </a:lnSpc>
+              <a:spcBef>
+                <a:spcPts val="0"/>
+              </a:spcBef>
+              <a:spcAft>
+                <a:spcPts val="0"/>
+              </a:spcAft>
+            </a:defPPr>
+            <a:lvl1pPr marR="0" lvl="0" algn="l" rtl="0">
+              <a:lnSpc>
+                <a:spcPct val="90000"/>
+              </a:lnSpc>
+              <a:spcBef>
+                <a:spcPts val="0"/>
+              </a:spcBef>
+              <a:spcAft>
+                <a:spcPts val="0"/>
+              </a:spcAft>
+              <a:buClr>
+                <a:schemeClr val="dk1"/>
+              </a:buClr>
+              <a:buSzPts val="5000"/>
+              <a:buFont typeface="Playfair Display Regular"/>
+              <a:buNone/>
+              <a:defRPr sz="5000" b="0" i="0" u="none" strike="noStrike" cap="none">
+                <a:solidFill>
+                  <a:schemeClr val="dk1"/>
+                </a:solidFill>
+                <a:latin typeface="Playfair Display Regular"/>
+                <a:ea typeface="Playfair Display Regular"/>
+                <a:cs typeface="Playfair Display Regular"/>
+                <a:sym typeface="Playfair Display Regular"/>
+              </a:defRPr>
+            </a:lvl1pPr>
+            <a:lvl2pPr marR="0" lvl="1" algn="l" rtl="0">
+              <a:lnSpc>
+                <a:spcPct val="90000"/>
+              </a:lnSpc>
+              <a:spcBef>
+                <a:spcPts val="0"/>
+              </a:spcBef>
+              <a:spcAft>
+                <a:spcPts val="0"/>
+              </a:spcAft>
+              <a:buClr>
+                <a:schemeClr val="dk1"/>
+              </a:buClr>
+              <a:buSzPts val="5000"/>
+              <a:buFont typeface="Playfair Display Regular"/>
+              <a:buNone/>
+              <a:defRPr sz="5000" b="0" i="0" u="none" strike="noStrike" cap="none">
+                <a:solidFill>
+                  <a:schemeClr val="dk1"/>
+                </a:solidFill>
+                <a:latin typeface="Playfair Display Regular"/>
+                <a:ea typeface="Playfair Display Regular"/>
+                <a:cs typeface="Playfair Display Regular"/>
+                <a:sym typeface="Playfair Display Regular"/>
+              </a:defRPr>
+            </a:lvl2pPr>
+            <a:lvl3pPr marR="0" lvl="2" algn="l" rtl="0">
+              <a:lnSpc>
+                <a:spcPct val="90000"/>
+              </a:lnSpc>
+              <a:spcBef>
+                <a:spcPts val="0"/>
+              </a:spcBef>
+              <a:spcAft>
+                <a:spcPts val="0"/>
+              </a:spcAft>
+              <a:buClr>
+                <a:schemeClr val="dk1"/>
+              </a:buClr>
+              <a:buSzPts val="5000"/>
+              <a:buFont typeface="Playfair Display Regular"/>
+              <a:buNone/>
+              <a:defRPr sz="5000" b="0" i="0" u="none" strike="noStrike" cap="none">
+                <a:solidFill>
+                  <a:schemeClr val="dk1"/>
+                </a:solidFill>
+                <a:latin typeface="Playfair Display Regular"/>
+                <a:ea typeface="Playfair Display Regular"/>
+                <a:cs typeface="Playfair Display Regular"/>
+                <a:sym typeface="Playfair Display Regular"/>
+              </a:defRPr>
+            </a:lvl3pPr>
+            <a:lvl4pPr marR="0" lvl="3" algn="l" rtl="0">
+              <a:lnSpc>
+                <a:spcPct val="90000"/>
+              </a:lnSpc>
+              <a:spcBef>
+                <a:spcPts val="0"/>
+              </a:spcBef>
+              <a:spcAft>
+                <a:spcPts val="0"/>
+              </a:spcAft>
+              <a:buClr>
+                <a:schemeClr val="dk1"/>
+              </a:buClr>
+              <a:buSzPts val="5000"/>
+              <a:buFont typeface="Playfair Display Regular"/>
+              <a:buNone/>
+              <a:defRPr sz="5000" b="0" i="0" u="none" strike="noStrike" cap="none">
+                <a:solidFill>
+                  <a:schemeClr val="dk1"/>
+                </a:solidFill>
+                <a:latin typeface="Playfair Display Regular"/>
+                <a:ea typeface="Playfair Display Regular"/>
+                <a:cs typeface="Playfair Display Regular"/>
+                <a:sym typeface="Playfair Display Regular"/>
+              </a:defRPr>
+            </a:lvl4pPr>
+            <a:lvl5pPr marR="0" lvl="4" algn="l" rtl="0">
+              <a:lnSpc>
+                <a:spcPct val="90000"/>
+              </a:lnSpc>
+              <a:spcBef>
+                <a:spcPts val="0"/>
+              </a:spcBef>
+              <a:spcAft>
+                <a:spcPts val="0"/>
+              </a:spcAft>
+              <a:buClr>
+                <a:schemeClr val="dk1"/>
+              </a:buClr>
+              <a:buSzPts val="5000"/>
+              <a:buFont typeface="Playfair Display Regular"/>
+              <a:buNone/>
+              <a:defRPr sz="5000" b="0" i="0" u="none" strike="noStrike" cap="none">
+                <a:solidFill>
+                  <a:schemeClr val="dk1"/>
+                </a:solidFill>
+                <a:latin typeface="Playfair Display Regular"/>
+                <a:ea typeface="Playfair Display Regular"/>
+                <a:cs typeface="Playfair Display Regular"/>
+                <a:sym typeface="Playfair Display Regular"/>
+              </a:defRPr>
+            </a:lvl5pPr>
+            <a:lvl6pPr marR="0" lvl="5" algn="l" rtl="0">
+              <a:lnSpc>
+                <a:spcPct val="90000"/>
+              </a:lnSpc>
+              <a:spcBef>
+                <a:spcPts val="0"/>
+              </a:spcBef>
+              <a:spcAft>
+                <a:spcPts val="0"/>
+              </a:spcAft>
+              <a:buClr>
+                <a:schemeClr val="dk1"/>
+              </a:buClr>
+              <a:buSzPts val="5000"/>
+              <a:buFont typeface="Playfair Display Regular"/>
+              <a:buNone/>
+              <a:defRPr sz="5000" b="0" i="0" u="none" strike="noStrike" cap="none">
+                <a:solidFill>
+                  <a:schemeClr val="dk1"/>
+                </a:solidFill>
+                <a:latin typeface="Playfair Display Regular"/>
+                <a:ea typeface="Playfair Display Regular"/>
+                <a:cs typeface="Playfair Display Regular"/>
+                <a:sym typeface="Playfair Display Regular"/>
+              </a:defRPr>
+            </a:lvl6pPr>
+            <a:lvl7pPr marR="0" lvl="6" algn="l" rtl="0">
+              <a:lnSpc>
+                <a:spcPct val="90000"/>
+              </a:lnSpc>
+              <a:spcBef>
+                <a:spcPts val="0"/>
+              </a:spcBef>
+              <a:spcAft>
+                <a:spcPts val="0"/>
+              </a:spcAft>
+              <a:buClr>
+                <a:schemeClr val="dk1"/>
+              </a:buClr>
+              <a:buSzPts val="5000"/>
+              <a:buFont typeface="Playfair Display Regular"/>
+              <a:buNone/>
+              <a:defRPr sz="5000" b="0" i="0" u="none" strike="noStrike" cap="none">
+                <a:solidFill>
+                  <a:schemeClr val="dk1"/>
+                </a:solidFill>
+                <a:latin typeface="Playfair Display Regular"/>
+                <a:ea typeface="Playfair Display Regular"/>
+                <a:cs typeface="Playfair Display Regular"/>
+                <a:sym typeface="Playfair Display Regular"/>
+              </a:defRPr>
+            </a:lvl7pPr>
+            <a:lvl8pPr marR="0" lvl="7" algn="l" rtl="0">
+              <a:lnSpc>
+                <a:spcPct val="90000"/>
+              </a:lnSpc>
+              <a:spcBef>
+                <a:spcPts val="0"/>
+              </a:spcBef>
+              <a:spcAft>
+                <a:spcPts val="0"/>
+              </a:spcAft>
+              <a:buClr>
+                <a:schemeClr val="dk1"/>
+              </a:buClr>
+              <a:buSzPts val="5000"/>
+              <a:buFont typeface="Playfair Display Regular"/>
+              <a:buNone/>
+              <a:defRPr sz="5000" b="0" i="0" u="none" strike="noStrike" cap="none">
+                <a:solidFill>
+                  <a:schemeClr val="dk1"/>
+                </a:solidFill>
+                <a:latin typeface="Playfair Display Regular"/>
+                <a:ea typeface="Playfair Display Regular"/>
+                <a:cs typeface="Playfair Display Regular"/>
+                <a:sym typeface="Playfair Display Regular"/>
+              </a:defRPr>
+            </a:lvl8pPr>
+            <a:lvl9pPr marR="0" lvl="8" algn="l" rtl="0">
+              <a:lnSpc>
+                <a:spcPct val="90000"/>
+              </a:lnSpc>
+              <a:spcBef>
+                <a:spcPts val="0"/>
+              </a:spcBef>
+              <a:spcAft>
+                <a:spcPts val="0"/>
+              </a:spcAft>
+              <a:buClr>
+                <a:schemeClr val="dk1"/>
+              </a:buClr>
+              <a:buSzPts val="5000"/>
+              <a:buFont typeface="Playfair Display Regular"/>
+              <a:buNone/>
+              <a:defRPr sz="5000" b="0" i="0" u="none" strike="noStrike" cap="none">
+                <a:solidFill>
+                  <a:schemeClr val="dk1"/>
+                </a:solidFill>
+                <a:latin typeface="Playfair Display Regular"/>
+                <a:ea typeface="Playfair Display Regular"/>
+                <a:cs typeface="Playfair Display Regular"/>
+                <a:sym typeface="Playfair Display Regular"/>
+              </a:defRPr>
+            </a:lvl9pPr>
+          </a:lstStyle>
+          <a:p>
+            <a:r>
+              <a:rPr lang="en-US" sz="1100" dirty="0">
+                <a:solidFill>
+                  <a:srgbClr val="272364"/>
+                </a:solidFill>
+                <a:latin typeface="Calibri" panose="020F0502020204030204" pitchFamily="34" charset="0"/>
+                <a:cs typeface="Calibri" panose="020F0502020204030204" pitchFamily="34" charset="0"/>
+              </a:rPr>
+              <a:t>Dashboard</a:t>
+            </a:r>
+          </a:p>
+        </p:txBody>
+      </p:sp>
+      <p:sp>
+        <p:nvSpPr>
+          <p:cNvPr id="16" name="Google Shape;79;p15">
+            <a:extLst>
+              <a:ext uri="{FF2B5EF4-FFF2-40B4-BE49-F238E27FC236}">
+                <a16:creationId xmlns:a16="http://schemas.microsoft.com/office/drawing/2014/main" id="{D2E0F7C6-4B5C-407D-928A-F47029569189}"/>
+              </a:ext>
+            </a:extLst>
+          </p:cNvPr>
+          <p:cNvSpPr txBox="1">
+            <a:spLocks/>
+          </p:cNvSpPr>
+          <p:nvPr/>
+        </p:nvSpPr>
+        <p:spPr>
+          <a:xfrm>
+            <a:off x="6297578" y="605510"/>
+            <a:ext cx="892249" cy="312588"/>
+          </a:xfrm>
+          <a:prstGeom prst="rect">
+            <a:avLst/>
+          </a:prstGeom>
+          <a:noFill/>
+          <a:ln>
+            <a:noFill/>
+          </a:ln>
+        </p:spPr>
+        <p:txBody>
+          <a:bodyPr spcFirstLastPara="1" wrap="square" lIns="0" tIns="0" rIns="0" bIns="0" anchor="ctr" anchorCtr="0">
+            <a:noAutofit/>
+          </a:bodyPr>
+          <a:lstStyle>
+            <a:defPPr marR="0" lvl="0" algn="l" rtl="0">
+              <a:lnSpc>
+                <a:spcPct val="100000"/>
+              </a:lnSpc>
+              <a:spcBef>
+                <a:spcPts val="0"/>
+              </a:spcBef>
+              <a:spcAft>
+                <a:spcPts val="0"/>
+              </a:spcAft>
+            </a:defPPr>
+            <a:lvl1pPr marR="0" lvl="0" algn="l" rtl="0">
+              <a:lnSpc>
+                <a:spcPct val="90000"/>
+              </a:lnSpc>
+              <a:spcBef>
+                <a:spcPts val="0"/>
+              </a:spcBef>
+              <a:spcAft>
+                <a:spcPts val="0"/>
+              </a:spcAft>
+              <a:buClr>
+                <a:schemeClr val="dk1"/>
+              </a:buClr>
+              <a:buSzPts val="5000"/>
+              <a:buFont typeface="Playfair Display Regular"/>
+              <a:buNone/>
+              <a:defRPr sz="5000" b="0" i="0" u="none" strike="noStrike" cap="none">
+                <a:solidFill>
+                  <a:schemeClr val="dk1"/>
+                </a:solidFill>
+                <a:latin typeface="Playfair Display Regular"/>
+                <a:ea typeface="Playfair Display Regular"/>
+                <a:cs typeface="Playfair Display Regular"/>
+                <a:sym typeface="Playfair Display Regular"/>
+              </a:defRPr>
+            </a:lvl1pPr>
+            <a:lvl2pPr marR="0" lvl="1" algn="l" rtl="0">
+              <a:lnSpc>
+                <a:spcPct val="90000"/>
+              </a:lnSpc>
+              <a:spcBef>
+                <a:spcPts val="0"/>
+              </a:spcBef>
+              <a:spcAft>
+                <a:spcPts val="0"/>
+              </a:spcAft>
+              <a:buClr>
+                <a:schemeClr val="dk1"/>
+              </a:buClr>
+              <a:buSzPts val="5000"/>
+              <a:buFont typeface="Playfair Display Regular"/>
+              <a:buNone/>
+              <a:defRPr sz="5000" b="0" i="0" u="none" strike="noStrike" cap="none">
+                <a:solidFill>
+                  <a:schemeClr val="dk1"/>
+                </a:solidFill>
+                <a:latin typeface="Playfair Display Regular"/>
+                <a:ea typeface="Playfair Display Regular"/>
+                <a:cs typeface="Playfair Display Regular"/>
+                <a:sym typeface="Playfair Display Regular"/>
+              </a:defRPr>
+            </a:lvl2pPr>
+            <a:lvl3pPr marR="0" lvl="2" algn="l" rtl="0">
+              <a:lnSpc>
+                <a:spcPct val="90000"/>
+              </a:lnSpc>
+              <a:spcBef>
+                <a:spcPts val="0"/>
+              </a:spcBef>
+              <a:spcAft>
+                <a:spcPts val="0"/>
+              </a:spcAft>
+              <a:buClr>
+                <a:schemeClr val="dk1"/>
+              </a:buClr>
+              <a:buSzPts val="5000"/>
+              <a:buFont typeface="Playfair Display Regular"/>
+              <a:buNone/>
+              <a:defRPr sz="5000" b="0" i="0" u="none" strike="noStrike" cap="none">
+                <a:solidFill>
+                  <a:schemeClr val="dk1"/>
+                </a:solidFill>
+                <a:latin typeface="Playfair Display Regular"/>
+                <a:ea typeface="Playfair Display Regular"/>
+                <a:cs typeface="Playfair Display Regular"/>
+                <a:sym typeface="Playfair Display Regular"/>
+              </a:defRPr>
+            </a:lvl3pPr>
+            <a:lvl4pPr marR="0" lvl="3" algn="l" rtl="0">
+              <a:lnSpc>
+                <a:spcPct val="90000"/>
+              </a:lnSpc>
+              <a:spcBef>
+                <a:spcPts val="0"/>
+              </a:spcBef>
+              <a:spcAft>
+                <a:spcPts val="0"/>
+              </a:spcAft>
+              <a:buClr>
+                <a:schemeClr val="dk1"/>
+              </a:buClr>
+              <a:buSzPts val="5000"/>
+              <a:buFont typeface="Playfair Display Regular"/>
+              <a:buNone/>
+              <a:defRPr sz="5000" b="0" i="0" u="none" strike="noStrike" cap="none">
+                <a:solidFill>
+                  <a:schemeClr val="dk1"/>
+                </a:solidFill>
+                <a:latin typeface="Playfair Display Regular"/>
+                <a:ea typeface="Playfair Display Regular"/>
+                <a:cs typeface="Playfair Display Regular"/>
+                <a:sym typeface="Playfair Display Regular"/>
+              </a:defRPr>
+            </a:lvl4pPr>
+            <a:lvl5pPr marR="0" lvl="4" algn="l" rtl="0">
+              <a:lnSpc>
+                <a:spcPct val="90000"/>
+              </a:lnSpc>
+              <a:spcBef>
+                <a:spcPts val="0"/>
+              </a:spcBef>
+              <a:spcAft>
+                <a:spcPts val="0"/>
+              </a:spcAft>
+              <a:buClr>
+                <a:schemeClr val="dk1"/>
+              </a:buClr>
+              <a:buSzPts val="5000"/>
+              <a:buFont typeface="Playfair Display Regular"/>
+              <a:buNone/>
+              <a:defRPr sz="5000" b="0" i="0" u="none" strike="noStrike" cap="none">
+                <a:solidFill>
+                  <a:schemeClr val="dk1"/>
+                </a:solidFill>
+                <a:latin typeface="Playfair Display Regular"/>
+                <a:ea typeface="Playfair Display Regular"/>
+                <a:cs typeface="Playfair Display Regular"/>
+                <a:sym typeface="Playfair Display Regular"/>
+              </a:defRPr>
+            </a:lvl5pPr>
+            <a:lvl6pPr marR="0" lvl="5" algn="l" rtl="0">
+              <a:lnSpc>
+                <a:spcPct val="90000"/>
+              </a:lnSpc>
+              <a:spcBef>
+                <a:spcPts val="0"/>
+              </a:spcBef>
+              <a:spcAft>
+                <a:spcPts val="0"/>
+              </a:spcAft>
+              <a:buClr>
+                <a:schemeClr val="dk1"/>
+              </a:buClr>
+              <a:buSzPts val="5000"/>
+              <a:buFont typeface="Playfair Display Regular"/>
+              <a:buNone/>
+              <a:defRPr sz="5000" b="0" i="0" u="none" strike="noStrike" cap="none">
+                <a:solidFill>
+                  <a:schemeClr val="dk1"/>
+                </a:solidFill>
+                <a:latin typeface="Playfair Display Regular"/>
+                <a:ea typeface="Playfair Display Regular"/>
+                <a:cs typeface="Playfair Display Regular"/>
+                <a:sym typeface="Playfair Display Regular"/>
+              </a:defRPr>
+            </a:lvl6pPr>
+            <a:lvl7pPr marR="0" lvl="6" algn="l" rtl="0">
+              <a:lnSpc>
+                <a:spcPct val="90000"/>
+              </a:lnSpc>
+              <a:spcBef>
+                <a:spcPts val="0"/>
+              </a:spcBef>
+              <a:spcAft>
+                <a:spcPts val="0"/>
+              </a:spcAft>
+              <a:buClr>
+                <a:schemeClr val="dk1"/>
+              </a:buClr>
+              <a:buSzPts val="5000"/>
+              <a:buFont typeface="Playfair Display Regular"/>
+              <a:buNone/>
+              <a:defRPr sz="5000" b="0" i="0" u="none" strike="noStrike" cap="none">
+                <a:solidFill>
+                  <a:schemeClr val="dk1"/>
+                </a:solidFill>
+                <a:latin typeface="Playfair Display Regular"/>
+                <a:ea typeface="Playfair Display Regular"/>
+                <a:cs typeface="Playfair Display Regular"/>
+                <a:sym typeface="Playfair Display Regular"/>
+              </a:defRPr>
+            </a:lvl7pPr>
+            <a:lvl8pPr marR="0" lvl="7" algn="l" rtl="0">
+              <a:lnSpc>
+                <a:spcPct val="90000"/>
+              </a:lnSpc>
+              <a:spcBef>
+                <a:spcPts val="0"/>
+              </a:spcBef>
+              <a:spcAft>
+                <a:spcPts val="0"/>
+              </a:spcAft>
+              <a:buClr>
+                <a:schemeClr val="dk1"/>
+              </a:buClr>
+              <a:buSzPts val="5000"/>
+              <a:buFont typeface="Playfair Display Regular"/>
+              <a:buNone/>
+              <a:defRPr sz="5000" b="0" i="0" u="none" strike="noStrike" cap="none">
+                <a:solidFill>
+                  <a:schemeClr val="dk1"/>
+                </a:solidFill>
+                <a:latin typeface="Playfair Display Regular"/>
+                <a:ea typeface="Playfair Display Regular"/>
+                <a:cs typeface="Playfair Display Regular"/>
+                <a:sym typeface="Playfair Display Regular"/>
+              </a:defRPr>
+            </a:lvl8pPr>
+            <a:lvl9pPr marR="0" lvl="8" algn="l" rtl="0">
+              <a:lnSpc>
+                <a:spcPct val="90000"/>
+              </a:lnSpc>
+              <a:spcBef>
+                <a:spcPts val="0"/>
+              </a:spcBef>
+              <a:spcAft>
+                <a:spcPts val="0"/>
+              </a:spcAft>
+              <a:buClr>
+                <a:schemeClr val="dk1"/>
+              </a:buClr>
+              <a:buSzPts val="5000"/>
+              <a:buFont typeface="Playfair Display Regular"/>
+              <a:buNone/>
+              <a:defRPr sz="5000" b="0" i="0" u="none" strike="noStrike" cap="none">
+                <a:solidFill>
+                  <a:schemeClr val="dk1"/>
+                </a:solidFill>
+                <a:latin typeface="Playfair Display Regular"/>
+                <a:ea typeface="Playfair Display Regular"/>
+                <a:cs typeface="Playfair Display Regular"/>
+                <a:sym typeface="Playfair Display Regular"/>
+              </a:defRPr>
+            </a:lvl9pPr>
+          </a:lstStyle>
+          <a:p>
+            <a:r>
+              <a:rPr lang="en-US" sz="1100" dirty="0">
+                <a:solidFill>
+                  <a:srgbClr val="272364"/>
+                </a:solidFill>
+                <a:latin typeface="Calibri" panose="020F0502020204030204" pitchFamily="34" charset="0"/>
+                <a:cs typeface="Calibri" panose="020F0502020204030204" pitchFamily="34" charset="0"/>
+              </a:rPr>
+              <a:t>About us</a:t>
+            </a:r>
+          </a:p>
+        </p:txBody>
+      </p:sp>
+      <p:sp>
+        <p:nvSpPr>
+          <p:cNvPr id="17" name="Google Shape;79;p15">
+            <a:extLst>
+              <a:ext uri="{FF2B5EF4-FFF2-40B4-BE49-F238E27FC236}">
+                <a16:creationId xmlns:a16="http://schemas.microsoft.com/office/drawing/2014/main" id="{1F9425B2-B246-4255-8A73-109F2C3CE715}"/>
+              </a:ext>
+            </a:extLst>
+          </p:cNvPr>
+          <p:cNvSpPr txBox="1">
+            <a:spLocks/>
+          </p:cNvSpPr>
+          <p:nvPr/>
+        </p:nvSpPr>
+        <p:spPr>
+          <a:xfrm>
+            <a:off x="8416961" y="605510"/>
+            <a:ext cx="365608" cy="312588"/>
+          </a:xfrm>
+          <a:prstGeom prst="rect">
+            <a:avLst/>
+          </a:prstGeom>
+          <a:noFill/>
+          <a:ln>
+            <a:noFill/>
+          </a:ln>
+        </p:spPr>
+        <p:txBody>
+          <a:bodyPr spcFirstLastPara="1" wrap="square" lIns="0" tIns="0" rIns="0" bIns="0" anchor="ctr" anchorCtr="0">
+            <a:noAutofit/>
+          </a:bodyPr>
+          <a:lstStyle>
+            <a:defPPr marR="0" lvl="0" algn="l" rtl="0">
+              <a:lnSpc>
+                <a:spcPct val="100000"/>
+              </a:lnSpc>
+              <a:spcBef>
+                <a:spcPts val="0"/>
+              </a:spcBef>
+              <a:spcAft>
+                <a:spcPts val="0"/>
+              </a:spcAft>
+            </a:defPPr>
+            <a:lvl1pPr marR="0" lvl="0" algn="l" rtl="0">
+              <a:lnSpc>
+                <a:spcPct val="90000"/>
+              </a:lnSpc>
+              <a:spcBef>
+                <a:spcPts val="0"/>
+              </a:spcBef>
+              <a:spcAft>
+                <a:spcPts val="0"/>
+              </a:spcAft>
+              <a:buClr>
+                <a:schemeClr val="dk1"/>
+              </a:buClr>
+              <a:buSzPts val="5000"/>
+              <a:buFont typeface="Playfair Display Regular"/>
+              <a:buNone/>
+              <a:defRPr sz="5000" b="0" i="0" u="none" strike="noStrike" cap="none">
+                <a:solidFill>
+                  <a:schemeClr val="dk1"/>
+                </a:solidFill>
+                <a:latin typeface="Playfair Display Regular"/>
+                <a:ea typeface="Playfair Display Regular"/>
+                <a:cs typeface="Playfair Display Regular"/>
+                <a:sym typeface="Playfair Display Regular"/>
+              </a:defRPr>
+            </a:lvl1pPr>
+            <a:lvl2pPr marR="0" lvl="1" algn="l" rtl="0">
+              <a:lnSpc>
+                <a:spcPct val="90000"/>
+              </a:lnSpc>
+              <a:spcBef>
+                <a:spcPts val="0"/>
+              </a:spcBef>
+              <a:spcAft>
+                <a:spcPts val="0"/>
+              </a:spcAft>
+              <a:buClr>
+                <a:schemeClr val="dk1"/>
+              </a:buClr>
+              <a:buSzPts val="5000"/>
+              <a:buFont typeface="Playfair Display Regular"/>
+              <a:buNone/>
+              <a:defRPr sz="5000" b="0" i="0" u="none" strike="noStrike" cap="none">
+                <a:solidFill>
+                  <a:schemeClr val="dk1"/>
+                </a:solidFill>
+                <a:latin typeface="Playfair Display Regular"/>
+                <a:ea typeface="Playfair Display Regular"/>
+                <a:cs typeface="Playfair Display Regular"/>
+                <a:sym typeface="Playfair Display Regular"/>
+              </a:defRPr>
+            </a:lvl2pPr>
+            <a:lvl3pPr marR="0" lvl="2" algn="l" rtl="0">
+              <a:lnSpc>
+                <a:spcPct val="90000"/>
+              </a:lnSpc>
+              <a:spcBef>
+                <a:spcPts val="0"/>
+              </a:spcBef>
+              <a:spcAft>
+                <a:spcPts val="0"/>
+              </a:spcAft>
+              <a:buClr>
+                <a:schemeClr val="dk1"/>
+              </a:buClr>
+              <a:buSzPts val="5000"/>
+              <a:buFont typeface="Playfair Display Regular"/>
+              <a:buNone/>
+              <a:defRPr sz="5000" b="0" i="0" u="none" strike="noStrike" cap="none">
+                <a:solidFill>
+                  <a:schemeClr val="dk1"/>
+                </a:solidFill>
+                <a:latin typeface="Playfair Display Regular"/>
+                <a:ea typeface="Playfair Display Regular"/>
+                <a:cs typeface="Playfair Display Regular"/>
+                <a:sym typeface="Playfair Display Regular"/>
+              </a:defRPr>
+            </a:lvl3pPr>
+            <a:lvl4pPr marR="0" lvl="3" algn="l" rtl="0">
+              <a:lnSpc>
+                <a:spcPct val="90000"/>
+              </a:lnSpc>
+              <a:spcBef>
+                <a:spcPts val="0"/>
+              </a:spcBef>
+              <a:spcAft>
+                <a:spcPts val="0"/>
+              </a:spcAft>
+              <a:buClr>
+                <a:schemeClr val="dk1"/>
+              </a:buClr>
+              <a:buSzPts val="5000"/>
+              <a:buFont typeface="Playfair Display Regular"/>
+              <a:buNone/>
+              <a:defRPr sz="5000" b="0" i="0" u="none" strike="noStrike" cap="none">
+                <a:solidFill>
+                  <a:schemeClr val="dk1"/>
+                </a:solidFill>
+                <a:latin typeface="Playfair Display Regular"/>
+                <a:ea typeface="Playfair Display Regular"/>
+                <a:cs typeface="Playfair Display Regular"/>
+                <a:sym typeface="Playfair Display Regular"/>
+              </a:defRPr>
+            </a:lvl4pPr>
+            <a:lvl5pPr marR="0" lvl="4" algn="l" rtl="0">
+              <a:lnSpc>
+                <a:spcPct val="90000"/>
+              </a:lnSpc>
+              <a:spcBef>
+                <a:spcPts val="0"/>
+              </a:spcBef>
+              <a:spcAft>
+                <a:spcPts val="0"/>
+              </a:spcAft>
+              <a:buClr>
+                <a:schemeClr val="dk1"/>
+              </a:buClr>
+              <a:buSzPts val="5000"/>
+              <a:buFont typeface="Playfair Display Regular"/>
+              <a:buNone/>
+              <a:defRPr sz="5000" b="0" i="0" u="none" strike="noStrike" cap="none">
+                <a:solidFill>
+                  <a:schemeClr val="dk1"/>
+                </a:solidFill>
+                <a:latin typeface="Playfair Display Regular"/>
+                <a:ea typeface="Playfair Display Regular"/>
+                <a:cs typeface="Playfair Display Regular"/>
+                <a:sym typeface="Playfair Display Regular"/>
+              </a:defRPr>
+            </a:lvl5pPr>
+            <a:lvl6pPr marR="0" lvl="5" algn="l" rtl="0">
+              <a:lnSpc>
+                <a:spcPct val="90000"/>
+              </a:lnSpc>
+              <a:spcBef>
+                <a:spcPts val="0"/>
+              </a:spcBef>
+              <a:spcAft>
+                <a:spcPts val="0"/>
+              </a:spcAft>
+              <a:buClr>
+                <a:schemeClr val="dk1"/>
+              </a:buClr>
+              <a:buSzPts val="5000"/>
+              <a:buFont typeface="Playfair Display Regular"/>
+              <a:buNone/>
+              <a:defRPr sz="5000" b="0" i="0" u="none" strike="noStrike" cap="none">
+                <a:solidFill>
+                  <a:schemeClr val="dk1"/>
+                </a:solidFill>
+                <a:latin typeface="Playfair Display Regular"/>
+                <a:ea typeface="Playfair Display Regular"/>
+                <a:cs typeface="Playfair Display Regular"/>
+                <a:sym typeface="Playfair Display Regular"/>
+              </a:defRPr>
+            </a:lvl6pPr>
+            <a:lvl7pPr marR="0" lvl="6" algn="l" rtl="0">
+              <a:lnSpc>
+                <a:spcPct val="90000"/>
+              </a:lnSpc>
+              <a:spcBef>
+                <a:spcPts val="0"/>
+              </a:spcBef>
+              <a:spcAft>
+                <a:spcPts val="0"/>
+              </a:spcAft>
+              <a:buClr>
+                <a:schemeClr val="dk1"/>
+              </a:buClr>
+              <a:buSzPts val="5000"/>
+              <a:buFont typeface="Playfair Display Regular"/>
+              <a:buNone/>
+              <a:defRPr sz="5000" b="0" i="0" u="none" strike="noStrike" cap="none">
+                <a:solidFill>
+                  <a:schemeClr val="dk1"/>
+                </a:solidFill>
+                <a:latin typeface="Playfair Display Regular"/>
+                <a:ea typeface="Playfair Display Regular"/>
+                <a:cs typeface="Playfair Display Regular"/>
+                <a:sym typeface="Playfair Display Regular"/>
+              </a:defRPr>
+            </a:lvl7pPr>
+            <a:lvl8pPr marR="0" lvl="7" algn="l" rtl="0">
+              <a:lnSpc>
+                <a:spcPct val="90000"/>
+              </a:lnSpc>
+              <a:spcBef>
+                <a:spcPts val="0"/>
+              </a:spcBef>
+              <a:spcAft>
+                <a:spcPts val="0"/>
+              </a:spcAft>
+              <a:buClr>
+                <a:schemeClr val="dk1"/>
+              </a:buClr>
+              <a:buSzPts val="5000"/>
+              <a:buFont typeface="Playfair Display Regular"/>
+              <a:buNone/>
+              <a:defRPr sz="5000" b="0" i="0" u="none" strike="noStrike" cap="none">
+                <a:solidFill>
+                  <a:schemeClr val="dk1"/>
+                </a:solidFill>
+                <a:latin typeface="Playfair Display Regular"/>
+                <a:ea typeface="Playfair Display Regular"/>
+                <a:cs typeface="Playfair Display Regular"/>
+                <a:sym typeface="Playfair Display Regular"/>
+              </a:defRPr>
+            </a:lvl8pPr>
+            <a:lvl9pPr marR="0" lvl="8" algn="l" rtl="0">
+              <a:lnSpc>
+                <a:spcPct val="90000"/>
+              </a:lnSpc>
+              <a:spcBef>
+                <a:spcPts val="0"/>
+              </a:spcBef>
+              <a:spcAft>
+                <a:spcPts val="0"/>
+              </a:spcAft>
+              <a:buClr>
+                <a:schemeClr val="dk1"/>
+              </a:buClr>
+              <a:buSzPts val="5000"/>
+              <a:buFont typeface="Playfair Display Regular"/>
+              <a:buNone/>
+              <a:defRPr sz="5000" b="0" i="0" u="none" strike="noStrike" cap="none">
+                <a:solidFill>
+                  <a:schemeClr val="dk1"/>
+                </a:solidFill>
+                <a:latin typeface="Playfair Display Regular"/>
+                <a:ea typeface="Playfair Display Regular"/>
+                <a:cs typeface="Playfair Display Regular"/>
+                <a:sym typeface="Playfair Display Regular"/>
+              </a:defRPr>
+            </a:lvl9pPr>
+          </a:lstStyle>
+          <a:p>
+            <a:r>
+              <a:rPr lang="en-US" sz="1100" dirty="0">
+                <a:solidFill>
+                  <a:srgbClr val="272364"/>
+                </a:solidFill>
+                <a:latin typeface="Calibri" panose="020F0502020204030204" pitchFamily="34" charset="0"/>
+                <a:cs typeface="Calibri" panose="020F0502020204030204" pitchFamily="34" charset="0"/>
+              </a:rPr>
+              <a:t>Login</a:t>
+            </a:r>
+          </a:p>
+        </p:txBody>
+      </p:sp>
+      <p:sp>
+        <p:nvSpPr>
+          <p:cNvPr id="18" name="Google Shape;79;p15">
+            <a:extLst>
+              <a:ext uri="{FF2B5EF4-FFF2-40B4-BE49-F238E27FC236}">
+                <a16:creationId xmlns:a16="http://schemas.microsoft.com/office/drawing/2014/main" id="{F5567429-17FC-439B-8089-5E5B2DC84B77}"/>
+              </a:ext>
+            </a:extLst>
+          </p:cNvPr>
+          <p:cNvSpPr txBox="1">
+            <a:spLocks/>
+          </p:cNvSpPr>
+          <p:nvPr/>
+        </p:nvSpPr>
+        <p:spPr>
+          <a:xfrm>
+            <a:off x="7124923" y="605510"/>
+            <a:ext cx="1017591" cy="312588"/>
+          </a:xfrm>
+          <a:prstGeom prst="rect">
+            <a:avLst/>
+          </a:prstGeom>
+          <a:noFill/>
+          <a:ln>
+            <a:noFill/>
+          </a:ln>
+        </p:spPr>
+        <p:txBody>
+          <a:bodyPr spcFirstLastPara="1" wrap="square" lIns="0" tIns="0" rIns="0" bIns="0" anchor="ctr" anchorCtr="0">
+            <a:noAutofit/>
+          </a:bodyPr>
+          <a:lstStyle>
+            <a:defPPr marR="0" lvl="0" algn="l" rtl="0">
+              <a:lnSpc>
+                <a:spcPct val="100000"/>
+              </a:lnSpc>
+              <a:spcBef>
+                <a:spcPts val="0"/>
+              </a:spcBef>
+              <a:spcAft>
+                <a:spcPts val="0"/>
+              </a:spcAft>
+            </a:defPPr>
+            <a:lvl1pPr marR="0" lvl="0" algn="l" rtl="0">
+              <a:lnSpc>
+                <a:spcPct val="90000"/>
+              </a:lnSpc>
+              <a:spcBef>
+                <a:spcPts val="0"/>
+              </a:spcBef>
+              <a:spcAft>
+                <a:spcPts val="0"/>
+              </a:spcAft>
+              <a:buClr>
+                <a:schemeClr val="dk1"/>
+              </a:buClr>
+              <a:buSzPts val="5000"/>
+              <a:buFont typeface="Playfair Display Regular"/>
+              <a:buNone/>
+              <a:defRPr sz="5000" b="0" i="0" u="none" strike="noStrike" cap="none">
+                <a:solidFill>
+                  <a:schemeClr val="dk1"/>
+                </a:solidFill>
+                <a:latin typeface="Playfair Display Regular"/>
+                <a:ea typeface="Playfair Display Regular"/>
+                <a:cs typeface="Playfair Display Regular"/>
+                <a:sym typeface="Playfair Display Regular"/>
+              </a:defRPr>
+            </a:lvl1pPr>
+            <a:lvl2pPr marR="0" lvl="1" algn="l" rtl="0">
+              <a:lnSpc>
+                <a:spcPct val="90000"/>
+              </a:lnSpc>
+              <a:spcBef>
+                <a:spcPts val="0"/>
+              </a:spcBef>
+              <a:spcAft>
+                <a:spcPts val="0"/>
+              </a:spcAft>
+              <a:buClr>
+                <a:schemeClr val="dk1"/>
+              </a:buClr>
+              <a:buSzPts val="5000"/>
+              <a:buFont typeface="Playfair Display Regular"/>
+              <a:buNone/>
+              <a:defRPr sz="5000" b="0" i="0" u="none" strike="noStrike" cap="none">
+                <a:solidFill>
+                  <a:schemeClr val="dk1"/>
+                </a:solidFill>
+                <a:latin typeface="Playfair Display Regular"/>
+                <a:ea typeface="Playfair Display Regular"/>
+                <a:cs typeface="Playfair Display Regular"/>
+                <a:sym typeface="Playfair Display Regular"/>
+              </a:defRPr>
+            </a:lvl2pPr>
+            <a:lvl3pPr marR="0" lvl="2" algn="l" rtl="0">
+              <a:lnSpc>
+                <a:spcPct val="90000"/>
+              </a:lnSpc>
+              <a:spcBef>
+                <a:spcPts val="0"/>
+              </a:spcBef>
+              <a:spcAft>
+                <a:spcPts val="0"/>
+              </a:spcAft>
+              <a:buClr>
+                <a:schemeClr val="dk1"/>
+              </a:buClr>
+              <a:buSzPts val="5000"/>
+              <a:buFont typeface="Playfair Display Regular"/>
+              <a:buNone/>
+              <a:defRPr sz="5000" b="0" i="0" u="none" strike="noStrike" cap="none">
+                <a:solidFill>
+                  <a:schemeClr val="dk1"/>
+                </a:solidFill>
+                <a:latin typeface="Playfair Display Regular"/>
+                <a:ea typeface="Playfair Display Regular"/>
+                <a:cs typeface="Playfair Display Regular"/>
+                <a:sym typeface="Playfair Display Regular"/>
+              </a:defRPr>
+            </a:lvl3pPr>
+            <a:lvl4pPr marR="0" lvl="3" algn="l" rtl="0">
+              <a:lnSpc>
+                <a:spcPct val="90000"/>
+              </a:lnSpc>
+              <a:spcBef>
+                <a:spcPts val="0"/>
+              </a:spcBef>
+              <a:spcAft>
+                <a:spcPts val="0"/>
+              </a:spcAft>
+              <a:buClr>
+                <a:schemeClr val="dk1"/>
+              </a:buClr>
+              <a:buSzPts val="5000"/>
+              <a:buFont typeface="Playfair Display Regular"/>
+              <a:buNone/>
+              <a:defRPr sz="5000" b="0" i="0" u="none" strike="noStrike" cap="none">
+                <a:solidFill>
+                  <a:schemeClr val="dk1"/>
+                </a:solidFill>
+                <a:latin typeface="Playfair Display Regular"/>
+                <a:ea typeface="Playfair Display Regular"/>
+                <a:cs typeface="Playfair Display Regular"/>
+                <a:sym typeface="Playfair Display Regular"/>
+              </a:defRPr>
+            </a:lvl4pPr>
+            <a:lvl5pPr marR="0" lvl="4" algn="l" rtl="0">
+              <a:lnSpc>
+                <a:spcPct val="90000"/>
+              </a:lnSpc>
+              <a:spcBef>
+                <a:spcPts val="0"/>
+              </a:spcBef>
+              <a:spcAft>
+                <a:spcPts val="0"/>
+              </a:spcAft>
+              <a:buClr>
+                <a:schemeClr val="dk1"/>
+              </a:buClr>
+              <a:buSzPts val="5000"/>
+              <a:buFont typeface="Playfair Display Regular"/>
+              <a:buNone/>
+              <a:defRPr sz="5000" b="0" i="0" u="none" strike="noStrike" cap="none">
+                <a:solidFill>
+                  <a:schemeClr val="dk1"/>
+                </a:solidFill>
+                <a:latin typeface="Playfair Display Regular"/>
+                <a:ea typeface="Playfair Display Regular"/>
+                <a:cs typeface="Playfair Display Regular"/>
+                <a:sym typeface="Playfair Display Regular"/>
+              </a:defRPr>
+            </a:lvl5pPr>
+            <a:lvl6pPr marR="0" lvl="5" algn="l" rtl="0">
+              <a:lnSpc>
+                <a:spcPct val="90000"/>
+              </a:lnSpc>
+              <a:spcBef>
+                <a:spcPts val="0"/>
+              </a:spcBef>
+              <a:spcAft>
+                <a:spcPts val="0"/>
+              </a:spcAft>
+              <a:buClr>
+                <a:schemeClr val="dk1"/>
+              </a:buClr>
+              <a:buSzPts val="5000"/>
+              <a:buFont typeface="Playfair Display Regular"/>
+              <a:buNone/>
+              <a:defRPr sz="5000" b="0" i="0" u="none" strike="noStrike" cap="none">
+                <a:solidFill>
+                  <a:schemeClr val="dk1"/>
+                </a:solidFill>
+                <a:latin typeface="Playfair Display Regular"/>
+                <a:ea typeface="Playfair Display Regular"/>
+                <a:cs typeface="Playfair Display Regular"/>
+                <a:sym typeface="Playfair Display Regular"/>
+              </a:defRPr>
+            </a:lvl6pPr>
+            <a:lvl7pPr marR="0" lvl="6" algn="l" rtl="0">
+              <a:lnSpc>
+                <a:spcPct val="90000"/>
+              </a:lnSpc>
+              <a:spcBef>
+                <a:spcPts val="0"/>
+              </a:spcBef>
+              <a:spcAft>
+                <a:spcPts val="0"/>
+              </a:spcAft>
+              <a:buClr>
+                <a:schemeClr val="dk1"/>
+              </a:buClr>
+              <a:buSzPts val="5000"/>
+              <a:buFont typeface="Playfair Display Regular"/>
+              <a:buNone/>
+              <a:defRPr sz="5000" b="0" i="0" u="none" strike="noStrike" cap="none">
+                <a:solidFill>
+                  <a:schemeClr val="dk1"/>
+                </a:solidFill>
+                <a:latin typeface="Playfair Display Regular"/>
+                <a:ea typeface="Playfair Display Regular"/>
+                <a:cs typeface="Playfair Display Regular"/>
+                <a:sym typeface="Playfair Display Regular"/>
+              </a:defRPr>
+            </a:lvl7pPr>
+            <a:lvl8pPr marR="0" lvl="7" algn="l" rtl="0">
+              <a:lnSpc>
+                <a:spcPct val="90000"/>
+              </a:lnSpc>
+              <a:spcBef>
+                <a:spcPts val="0"/>
+              </a:spcBef>
+              <a:spcAft>
+                <a:spcPts val="0"/>
+              </a:spcAft>
+              <a:buClr>
+                <a:schemeClr val="dk1"/>
+              </a:buClr>
+              <a:buSzPts val="5000"/>
+              <a:buFont typeface="Playfair Display Regular"/>
+              <a:buNone/>
+              <a:defRPr sz="5000" b="0" i="0" u="none" strike="noStrike" cap="none">
+                <a:solidFill>
+                  <a:schemeClr val="dk1"/>
+                </a:solidFill>
+                <a:latin typeface="Playfair Display Regular"/>
+                <a:ea typeface="Playfair Display Regular"/>
+                <a:cs typeface="Playfair Display Regular"/>
+                <a:sym typeface="Playfair Display Regular"/>
+              </a:defRPr>
+            </a:lvl8pPr>
+            <a:lvl9pPr marR="0" lvl="8" algn="l" rtl="0">
+              <a:lnSpc>
+                <a:spcPct val="90000"/>
+              </a:lnSpc>
+              <a:spcBef>
+                <a:spcPts val="0"/>
+              </a:spcBef>
+              <a:spcAft>
+                <a:spcPts val="0"/>
+              </a:spcAft>
+              <a:buClr>
+                <a:schemeClr val="dk1"/>
+              </a:buClr>
+              <a:buSzPts val="5000"/>
+              <a:buFont typeface="Playfair Display Regular"/>
+              <a:buNone/>
+              <a:defRPr sz="5000" b="0" i="0" u="none" strike="noStrike" cap="none">
+                <a:solidFill>
+                  <a:schemeClr val="dk1"/>
+                </a:solidFill>
+                <a:latin typeface="Playfair Display Regular"/>
+                <a:ea typeface="Playfair Display Regular"/>
+                <a:cs typeface="Playfair Display Regular"/>
+                <a:sym typeface="Playfair Display Regular"/>
+              </a:defRPr>
+            </a:lvl9pPr>
+          </a:lstStyle>
+          <a:p>
+            <a:r>
+              <a:rPr lang="en-US" sz="1100" dirty="0">
+                <a:solidFill>
+                  <a:srgbClr val="272364"/>
+                </a:solidFill>
+                <a:latin typeface="Calibri" panose="020F0502020204030204" pitchFamily="34" charset="0"/>
+                <a:cs typeface="Calibri" panose="020F0502020204030204" pitchFamily="34" charset="0"/>
+              </a:rPr>
+              <a:t>Getting started</a:t>
+            </a:r>
+          </a:p>
+        </p:txBody>
+      </p:sp>
+    </p:spTree>
+    <p:extLst>
+      <p:ext uri="{BB962C8B-B14F-4D97-AF65-F5344CB8AC3E}">
+        <p14:creationId xmlns:p14="http://schemas.microsoft.com/office/powerpoint/2010/main" val="3249981803"/>
+      </p:ext>
+    </p:extLst>
+  </p:cSld>
+  <p:clrMapOvr>
+    <a:masterClrMapping/>
+  </p:clrMapOvr>
+</p:sld>
+</file>
+
+<file path=ppt/slides/slide6.xml><?xml version="1.0" encoding="utf-8"?>
+<p:sld xmlns:a="http://schemas.openxmlformats.org/drawingml/2006/main" xmlns:r="http://schemas.openxmlformats.org/officeDocument/2006/relationships" xmlns:p="http://schemas.openxmlformats.org/presentationml/2006/main" showMasterSp="0">
+  <p:cSld>
+    <p:bg>
+      <p:bgPr>
+        <a:pattFill prst="pct80">
+          <a:fgClr>
+            <a:schemeClr val="lt2"/>
+          </a:fgClr>
+          <a:bgClr>
+            <a:schemeClr val="bg1"/>
+          </a:bgClr>
+        </a:pattFill>
+        <a:effectLst/>
+      </p:bgPr>
+    </p:bg>
+    <p:spTree>
+      <p:nvGrpSpPr>
+        <p:cNvPr id="1" name="Shape 78"/>
+        <p:cNvGrpSpPr/>
+        <p:nvPr/>
+      </p:nvGrpSpPr>
+      <p:grpSpPr>
+        <a:xfrm>
+          <a:off x="0" y="0"/>
+          <a:ext cx="0" cy="0"/>
+          <a:chOff x="0" y="0"/>
+          <a:chExt cx="0" cy="0"/>
+        </a:xfrm>
+      </p:grpSpPr>
       <p:sp>
         <p:nvSpPr>
           <p:cNvPr id="20" name="Terminator 19">
@@ -14901,7 +16832,7 @@
 </p:sld>
 </file>
 
-<file path=ppt/slides/slide6.xml><?xml version="1.0" encoding="utf-8"?>
+<file path=ppt/slides/slide7.xml><?xml version="1.0" encoding="utf-8"?>
 <p:sld xmlns:a="http://schemas.openxmlformats.org/drawingml/2006/main" xmlns:r="http://schemas.openxmlformats.org/officeDocument/2006/relationships" xmlns:p="http://schemas.openxmlformats.org/presentationml/2006/main" showMasterSp="0">
   <p:cSld>
     <p:bg>

</xml_diff>

<commit_message>
Added a picture to the slide
</commit_message>
<xml_diff>
--- a/resources/glucocheck-Demo2.pptx
+++ b/resources/glucocheck-Demo2.pptx
@@ -13538,7 +13538,7 @@
         <p:spPr>
           <a:xfrm>
             <a:off x="496845" y="2023900"/>
-            <a:ext cx="4583746" cy="2321085"/>
+            <a:ext cx="4169076" cy="2644250"/>
           </a:xfrm>
           <a:prstGeom prst="rect">
             <a:avLst/>
@@ -13640,42 +13640,6 @@
           </a:p>
         </p:txBody>
       </p:sp>
-      <p:pic>
-        <p:nvPicPr>
-          <p:cNvPr id="6" name="Graphic 5">
-            <a:extLst>
-              <a:ext uri="{FF2B5EF4-FFF2-40B4-BE49-F238E27FC236}">
-                <a16:creationId xmlns:a16="http://schemas.microsoft.com/office/drawing/2014/main" id="{11450E05-AE9B-4A06-BF5F-D5CA4E0AB273}"/>
-              </a:ext>
-            </a:extLst>
-          </p:cNvPr>
-          <p:cNvPicPr>
-            <a:picLocks noChangeAspect="1"/>
-          </p:cNvPicPr>
-          <p:nvPr/>
-        </p:nvPicPr>
-        <p:blipFill>
-          <a:blip r:embed="rId6">
-            <a:extLst>
-              <a:ext uri="{96DAC541-7B7A-43D3-8B79-37D633B846F1}">
-                <asvg:svgBlip xmlns:asvg="http://schemas.microsoft.com/office/drawing/2016/SVG/main" r:embed="rId7"/>
-              </a:ext>
-            </a:extLst>
-          </a:blip>
-          <a:stretch>
-            <a:fillRect/>
-          </a:stretch>
-        </p:blipFill>
-        <p:spPr>
-          <a:xfrm>
-            <a:off x="5514045" y="1624398"/>
-            <a:ext cx="2899145" cy="2899145"/>
-          </a:xfrm>
-          <a:prstGeom prst="rect">
-            <a:avLst/>
-          </a:prstGeom>
-        </p:spPr>
-      </p:pic>
       <p:sp>
         <p:nvSpPr>
           <p:cNvPr id="14" name="Google Shape;79;p15">
@@ -15143,6 +15107,53 @@
           </a:p>
         </p:txBody>
       </p:sp>
+      <p:pic>
+        <p:nvPicPr>
+          <p:cNvPr id="1028" name="Picture 4">
+            <a:extLst>
+              <a:ext uri="{FF2B5EF4-FFF2-40B4-BE49-F238E27FC236}">
+                <a16:creationId xmlns:a16="http://schemas.microsoft.com/office/drawing/2014/main" id="{3289EF54-5C38-441B-8378-5CC5E927FA54}"/>
+              </a:ext>
+            </a:extLst>
+          </p:cNvPr>
+          <p:cNvPicPr>
+            <a:picLocks noChangeAspect="1" noChangeArrowheads="1"/>
+          </p:cNvPicPr>
+          <p:nvPr/>
+        </p:nvPicPr>
+        <p:blipFill>
+          <a:blip r:embed="rId6">
+            <a:extLst>
+              <a:ext uri="{28A0092B-C50C-407E-A947-70E740481C1C}">
+                <a14:useLocalDpi xmlns:a14="http://schemas.microsoft.com/office/drawing/2010/main" val="0"/>
+              </a:ext>
+            </a:extLst>
+          </a:blip>
+          <a:srcRect/>
+          <a:stretch>
+            <a:fillRect/>
+          </a:stretch>
+        </p:blipFill>
+        <p:spPr bwMode="auto">
+          <a:xfrm>
+            <a:off x="5029624" y="2669788"/>
+            <a:ext cx="3749024" cy="2279812"/>
+          </a:xfrm>
+          <a:prstGeom prst="rect">
+            <a:avLst/>
+          </a:prstGeom>
+          <a:noFill/>
+          <a:extLst>
+            <a:ext uri="{909E8E84-426E-40DD-AFC4-6F175D3DCCD1}">
+              <a14:hiddenFill xmlns:a14="http://schemas.microsoft.com/office/drawing/2010/main">
+                <a:solidFill>
+                  <a:srgbClr val="FFFFFF"/>
+                </a:solidFill>
+              </a14:hiddenFill>
+            </a:ext>
+          </a:extLst>
+        </p:spPr>
+      </p:pic>
     </p:spTree>
     <p:extLst>
       <p:ext uri="{BB962C8B-B14F-4D97-AF65-F5344CB8AC3E}">

</xml_diff>